<commit_message>
Final changes to SP20
</commit_message>
<xml_diff>
--- a/C6-ControlFlow.pptx
+++ b/C6-ControlFlow.pptx
@@ -5,7 +5,7 @@
     <p:sldMasterId id="2147483648" r:id="rId1"/>
   </p:sldMasterIdLst>
   <p:notesMasterIdLst>
-    <p:notesMasterId r:id="rId36"/>
+    <p:notesMasterId r:id="rId34"/>
   </p:notesMasterIdLst>
   <p:sldIdLst>
     <p:sldId id="256" r:id="rId2"/>
@@ -35,13 +35,11 @@
     <p:sldId id="267" r:id="rId26"/>
     <p:sldId id="268" r:id="rId27"/>
     <p:sldId id="269" r:id="rId28"/>
-    <p:sldId id="270" r:id="rId29"/>
-    <p:sldId id="271" r:id="rId30"/>
-    <p:sldId id="272" r:id="rId31"/>
-    <p:sldId id="273" r:id="rId32"/>
-    <p:sldId id="274" r:id="rId33"/>
-    <p:sldId id="275" r:id="rId34"/>
-    <p:sldId id="276" r:id="rId35"/>
+    <p:sldId id="272" r:id="rId29"/>
+    <p:sldId id="273" r:id="rId30"/>
+    <p:sldId id="274" r:id="rId31"/>
+    <p:sldId id="275" r:id="rId32"/>
+    <p:sldId id="276" r:id="rId33"/>
   </p:sldIdLst>
   <p:sldSz cx="12192000" cy="6858000"/>
   <p:notesSz cx="6858000" cy="9144000"/>
@@ -11935,7 +11933,7 @@
         </p:nvSpPr>
         <p:spPr>
           <a:xfrm>
-            <a:off x="387927" y="1825625"/>
+            <a:off x="311727" y="1586574"/>
             <a:ext cx="7453746" cy="4351338"/>
           </a:xfrm>
         </p:spPr>
@@ -11994,6 +11992,28 @@
             <a:r>
               <a:rPr lang="en-US" sz="2200" dirty="0"/>
               <a:t>A lot of book-keeping: state in registers, fetching access links</a:t>
+            </a:r>
+          </a:p>
+          <a:p>
+            <a:r>
+              <a:rPr lang="en-US" sz="2200" dirty="0"/>
+              <a:t>Think how to implement the </a:t>
+            </a:r>
+            <a:r>
+              <a:rPr lang="en-US" sz="2200" u="sng" dirty="0"/>
+              <a:t>break</a:t>
+            </a:r>
+            <a:r>
+              <a:rPr lang="en-US" sz="2200" dirty="0"/>
+              <a:t> and </a:t>
+            </a:r>
+            <a:r>
+              <a:rPr lang="en-US" sz="2200" u="sng" dirty="0"/>
+              <a:t>continue </a:t>
+            </a:r>
+            <a:r>
+              <a:rPr lang="en-US" sz="2200" dirty="0"/>
+              <a:t>constructs in our compiler</a:t>
             </a:r>
           </a:p>
         </p:txBody>
@@ -14558,10 +14578,15 @@
             <p:ph idx="1"/>
           </p:nvPr>
         </p:nvSpPr>
-        <p:spPr/>
+        <p:spPr>
+          <a:xfrm>
+            <a:off x="387927" y="1454727"/>
+            <a:ext cx="11596255" cy="4722236"/>
+          </a:xfrm>
+        </p:spPr>
         <p:txBody>
           <a:bodyPr>
-            <a:normAutofit fontScale="92500" lnSpcReduction="10000"/>
+            <a:normAutofit lnSpcReduction="10000"/>
           </a:bodyPr>
           <a:lstStyle/>
           <a:p>
@@ -15115,21 +15140,8 @@
             </a:pPr>
             <a:r>
               <a:rPr lang="en-US" sz="2000" dirty="0"/>
-              <a:t>references (i.e. address/locations) flow from </a:t>
-            </a:r>
-            <a:r>
-              <a:rPr lang="en-US" sz="2000" dirty="0" err="1"/>
-              <a:t>lhs</a:t>
-            </a:r>
-            <a:r>
-              <a:rPr lang="en-US" sz="2000" dirty="0"/>
-              <a:t> to </a:t>
-            </a:r>
-            <a:r>
-              <a:rPr lang="en-US" sz="2000" dirty="0" err="1"/>
-              <a:t>rhs</a:t>
-            </a:r>
-            <a:endParaRPr lang="en-US" sz="2000" dirty="0"/>
+              <a:t>All variables are l-values</a:t>
+            </a:r>
           </a:p>
           <a:p>
             <a:pPr lvl="1">
@@ -15138,17 +15150,6 @@
               </a:lnSpc>
             </a:pPr>
             <a:r>
-              <a:rPr lang="en-US" sz="2000" dirty="0"/>
-              <a:t>All variables are l-values</a:t>
-            </a:r>
-          </a:p>
-          <a:p>
-            <a:pPr lvl="1">
-              <a:lnSpc>
-                <a:spcPct val="120000"/>
-              </a:lnSpc>
-            </a:pPr>
-            <a:r>
               <a:rPr lang="en-US" sz="2000" dirty="0">
                 <a:highlight>
                   <a:srgbClr val="00FF00"/>
@@ -15170,7 +15171,7 @@
                   <a:srgbClr val="00FF00"/>
                 </a:highlight>
               </a:rPr>
-              <a:t> contexts</a:t>
+              <a:t> contexts (equivalent to doing *variable in C)</a:t>
             </a:r>
           </a:p>
           <a:p>
@@ -15265,7 +15266,7 @@
               <a:rPr lang="en-US" smtClean="0"/>
               <a:t>26</a:t>
             </a:fld>
-            <a:endParaRPr lang="en-US"/>
+            <a:endParaRPr lang="en-US" dirty="0"/>
           </a:p>
         </p:txBody>
       </p:sp>
@@ -15341,7 +15342,7 @@
         </p:nvSpPr>
         <p:spPr>
           <a:xfrm>
-            <a:off x="7516586" y="5089683"/>
+            <a:off x="7764484" y="5257408"/>
             <a:ext cx="892628" cy="511628"/>
           </a:xfrm>
           <a:prstGeom prst="rightArrow">
@@ -15387,7 +15388,7 @@
         </p:nvSpPr>
         <p:spPr>
           <a:xfrm>
-            <a:off x="8727690" y="5139646"/>
+            <a:off x="8844780" y="5373442"/>
             <a:ext cx="2509020" cy="461665"/>
           </a:xfrm>
           <a:prstGeom prst="rect">
@@ -15933,7 +15934,7 @@
           <p:cNvPr id="2" name="Title 1">
             <a:extLst>
               <a:ext uri="{FF2B5EF4-FFF2-40B4-BE49-F238E27FC236}">
-                <a16:creationId xmlns:a16="http://schemas.microsoft.com/office/drawing/2014/main" id="{84493E4A-53D3-AF47-87DE-0AF5EB271FE1}"/>
+                <a16:creationId xmlns:a16="http://schemas.microsoft.com/office/drawing/2014/main" id="{CAD010CF-B650-1D4F-9663-6E9DE2D0CE8B}"/>
               </a:ext>
             </a:extLst>
           </p:cNvPr>
@@ -15951,7 +15952,7 @@
           <a:p>
             <a:r>
               <a:rPr lang="en-US" dirty="0"/>
-              <a:t>Orthogonality</a:t>
+              <a:t>Assignment Operators</a:t>
             </a:r>
           </a:p>
         </p:txBody>
@@ -15961,7 +15962,7 @@
           <p:cNvPr id="3" name="Content Placeholder 2">
             <a:extLst>
               <a:ext uri="{FF2B5EF4-FFF2-40B4-BE49-F238E27FC236}">
-                <a16:creationId xmlns:a16="http://schemas.microsoft.com/office/drawing/2014/main" id="{5650D278-BF5D-504F-86EA-71850C4892FE}"/>
+                <a16:creationId xmlns:a16="http://schemas.microsoft.com/office/drawing/2014/main" id="{58E44E04-8B91-F14F-9E76-4CB7115475FA}"/>
               </a:ext>
             </a:extLst>
           </p:cNvPr>
@@ -15972,101 +15973,101 @@
             <p:ph idx="1"/>
           </p:nvPr>
         </p:nvSpPr>
-        <p:spPr>
-          <a:xfrm>
-            <a:off x="435428" y="1847398"/>
-            <a:ext cx="6945086" cy="4351338"/>
-          </a:xfrm>
-        </p:spPr>
+        <p:spPr/>
         <p:txBody>
           <a:bodyPr>
-            <a:normAutofit fontScale="92500" lnSpcReduction="20000"/>
+            <a:noAutofit/>
           </a:bodyPr>
           <a:lstStyle/>
           <a:p>
-            <a:pPr>
-              <a:lnSpc>
-                <a:spcPct val="120000"/>
-              </a:lnSpc>
-            </a:pPr>
-            <a:r>
-              <a:rPr lang="en-US" sz="2400" dirty="0"/>
-              <a:t>Means: independent, consistent, to be used in any combination</a:t>
-            </a:r>
-          </a:p>
-          <a:p>
-            <a:pPr>
-              <a:lnSpc>
-                <a:spcPct val="120000"/>
-              </a:lnSpc>
-            </a:pPr>
-            <a:r>
-              <a:rPr lang="en-US" sz="2400" dirty="0"/>
-              <a:t>The book uses it as ”stuff that you would expect to appear somewhere, but it may or may not”</a:t>
-            </a:r>
-          </a:p>
-          <a:p>
-            <a:pPr>
-              <a:lnSpc>
-                <a:spcPct val="120000"/>
-              </a:lnSpc>
-            </a:pPr>
-            <a:r>
-              <a:rPr lang="en-US" sz="2400" dirty="0"/>
-              <a:t>It’s a design principle</a:t>
-            </a:r>
-          </a:p>
-          <a:p>
-            <a:pPr>
-              <a:lnSpc>
-                <a:spcPct val="120000"/>
-              </a:lnSpc>
-            </a:pPr>
-            <a:r>
-              <a:rPr lang="en-US" sz="2400" dirty="0"/>
-              <a:t>Example: Algol68 was expression oriented </a:t>
-            </a:r>
-            <a:r>
-              <a:rPr lang="en-US" sz="2400" dirty="0">
-                <a:sym typeface="Wingdings" pitchFamily="2" charset="2"/>
-              </a:rPr>
-              <a:t> expression basically the same as statement</a:t>
-            </a:r>
-          </a:p>
-          <a:p>
-            <a:pPr lvl="1">
-              <a:lnSpc>
-                <a:spcPct val="120000"/>
-              </a:lnSpc>
-            </a:pPr>
-            <a:r>
-              <a:rPr lang="en-US" dirty="0">
-                <a:sym typeface="Wingdings" pitchFamily="2" charset="2"/>
-              </a:rPr>
-              <a:t>Expressions could appear in places where statements would be expected (this again is relative)</a:t>
-            </a:r>
-          </a:p>
-          <a:p>
-            <a:pPr lvl="1">
-              <a:lnSpc>
-                <a:spcPct val="120000"/>
-              </a:lnSpc>
-            </a:pPr>
-            <a:r>
-              <a:rPr lang="en-US" dirty="0">
-                <a:sym typeface="Wingdings" pitchFamily="2" charset="2"/>
-              </a:rPr>
-              <a:t>Similar constructs of other languages could appear as expressions</a:t>
-            </a:r>
-            <a:endParaRPr lang="en-US" dirty="0"/>
-          </a:p>
-          <a:p>
-            <a:pPr>
-              <a:lnSpc>
-                <a:spcPct val="120000"/>
-              </a:lnSpc>
-            </a:pPr>
-            <a:endParaRPr lang="en-US" sz="2400" dirty="0"/>
+            <a:r>
+              <a:rPr lang="en-US" sz="2200" dirty="0"/>
+              <a:t>Assignment operators modify memory:</a:t>
+            </a:r>
+          </a:p>
+          <a:p>
+            <a:pPr lvl="1"/>
+            <a:r>
+              <a:rPr lang="en-US" sz="2200" dirty="0"/>
+              <a:t>+=</a:t>
+            </a:r>
+          </a:p>
+          <a:p>
+            <a:pPr lvl="1"/>
+            <a:r>
+              <a:rPr lang="en-US" sz="2200" dirty="0"/>
+              <a:t>*=</a:t>
+            </a:r>
+          </a:p>
+          <a:p>
+            <a:pPr lvl="1"/>
+            <a:r>
+              <a:rPr lang="en-US" sz="2200" dirty="0"/>
+              <a:t>op=</a:t>
+            </a:r>
+          </a:p>
+          <a:p>
+            <a:r>
+              <a:rPr lang="en-US" sz="2200" dirty="0"/>
+              <a:t>Advantage: </a:t>
+            </a:r>
+          </a:p>
+          <a:p>
+            <a:pPr lvl="1"/>
+            <a:r>
+              <a:rPr lang="en-US" sz="2200" dirty="0"/>
+              <a:t>address calculation performed just once </a:t>
+            </a:r>
+          </a:p>
+          <a:p>
+            <a:pPr lvl="1"/>
+            <a:r>
+              <a:rPr lang="en-US" sz="2200" dirty="0"/>
+              <a:t>simplifies code (we write a lot of  something = something + </a:t>
+            </a:r>
+            <a:r>
+              <a:rPr lang="en-US" sz="2200" dirty="0" err="1"/>
+              <a:t>somethingelse</a:t>
+            </a:r>
+            <a:r>
+              <a:rPr lang="en-US" sz="2200" dirty="0"/>
+              <a:t>)</a:t>
+            </a:r>
+          </a:p>
+          <a:p>
+            <a:r>
+              <a:rPr lang="en-US" sz="2200" dirty="0"/>
+              <a:t>C provides an assignment operator for each of its binary arithmetic and bit-wise operators, for a total of 10</a:t>
+            </a:r>
+          </a:p>
+          <a:p>
+            <a:pPr lvl="1"/>
+            <a:r>
+              <a:rPr lang="en-US" sz="2200" dirty="0"/>
+              <a:t>also prefix and postfix [</a:t>
+            </a:r>
+            <a:r>
+              <a:rPr lang="en-US" sz="2200" dirty="0" err="1"/>
+              <a:t>in|de</a:t>
+            </a:r>
+            <a:r>
+              <a:rPr lang="en-US" sz="2200" dirty="0"/>
+              <a:t>]</a:t>
+            </a:r>
+            <a:r>
+              <a:rPr lang="en-US" sz="2200" dirty="0" err="1"/>
+              <a:t>crements</a:t>
+            </a:r>
+            <a:r>
+              <a:rPr lang="en-US" sz="2200" dirty="0"/>
+              <a:t>: var++, ++var, var-- and –var</a:t>
+            </a:r>
+          </a:p>
+          <a:p>
+            <a:r>
+              <a:rPr lang="en-US" sz="2200" dirty="0"/>
+              <a:t>Prefix form: syntactic sugar for += and -=</a:t>
+            </a:r>
           </a:p>
         </p:txBody>
       </p:sp>
@@ -16075,7 +16076,7 @@
           <p:cNvPr id="4" name="Footer Placeholder 3">
             <a:extLst>
               <a:ext uri="{FF2B5EF4-FFF2-40B4-BE49-F238E27FC236}">
-                <a16:creationId xmlns:a16="http://schemas.microsoft.com/office/drawing/2014/main" id="{162EA0CC-988E-7748-8162-2D08FFF60C1B}"/>
+                <a16:creationId xmlns:a16="http://schemas.microsoft.com/office/drawing/2014/main" id="{4F2F4CC8-DD49-5546-BB91-6D864ED389B1}"/>
               </a:ext>
             </a:extLst>
           </p:cNvPr>
@@ -16103,7 +16104,7 @@
           <p:cNvPr id="5" name="Slide Number Placeholder 4">
             <a:extLst>
               <a:ext uri="{FF2B5EF4-FFF2-40B4-BE49-F238E27FC236}">
-                <a16:creationId xmlns:a16="http://schemas.microsoft.com/office/drawing/2014/main" id="{7E21B887-4271-0F46-9320-52847E6D6497}"/>
+                <a16:creationId xmlns:a16="http://schemas.microsoft.com/office/drawing/2014/main" id="{5644DC75-A76A-B349-BFFD-CC0F7EAA6036}"/>
               </a:ext>
             </a:extLst>
           </p:cNvPr>
@@ -16127,188 +16128,10 @@
           </a:p>
         </p:txBody>
       </p:sp>
-      <p:sp>
-        <p:nvSpPr>
-          <p:cNvPr id="6" name="TextBox 5">
-            <a:extLst>
-              <a:ext uri="{FF2B5EF4-FFF2-40B4-BE49-F238E27FC236}">
-                <a16:creationId xmlns:a16="http://schemas.microsoft.com/office/drawing/2014/main" id="{8FEABC74-0E78-3548-9C58-9A2B5C943F04}"/>
-              </a:ext>
-            </a:extLst>
-          </p:cNvPr>
-          <p:cNvSpPr txBox="1"/>
-          <p:nvPr/>
-        </p:nvSpPr>
-        <p:spPr>
-          <a:xfrm>
-            <a:off x="7576458" y="2597873"/>
-            <a:ext cx="4458272" cy="1754326"/>
-          </a:xfrm>
-          <a:prstGeom prst="rect">
-            <a:avLst/>
-          </a:prstGeom>
-          <a:noFill/>
-          <a:ln w="57150">
-            <a:solidFill>
-              <a:srgbClr val="00B050"/>
-            </a:solidFill>
-          </a:ln>
-        </p:spPr>
-        <p:txBody>
-          <a:bodyPr wrap="none" rtlCol="0">
-            <a:spAutoFit/>
-          </a:bodyPr>
-          <a:lstStyle/>
-          <a:p>
-            <a:r>
-              <a:rPr lang="en-US" dirty="0">
-                <a:latin typeface="Courier" pitchFamily="2" charset="0"/>
-              </a:rPr>
-              <a:t>begin</a:t>
-            </a:r>
-          </a:p>
-          <a:p>
-            <a:r>
-              <a:rPr lang="en-US" dirty="0">
-                <a:latin typeface="Courier" pitchFamily="2" charset="0"/>
-              </a:rPr>
-              <a:t>  a := if  b &lt; c then d else e;</a:t>
-            </a:r>
-          </a:p>
-          <a:p>
-            <a:r>
-              <a:rPr lang="en-US" dirty="0">
-                <a:latin typeface="Courier" pitchFamily="2" charset="0"/>
-              </a:rPr>
-              <a:t>  a := begin f(b); g(c) end;</a:t>
-            </a:r>
-          </a:p>
-          <a:p>
-            <a:r>
-              <a:rPr lang="en-US" dirty="0">
-                <a:latin typeface="Courier" pitchFamily="2" charset="0"/>
-              </a:rPr>
-              <a:t>  g(d);</a:t>
-            </a:r>
-          </a:p>
-          <a:p>
-            <a:r>
-              <a:rPr lang="en-US" dirty="0">
-                <a:latin typeface="Courier" pitchFamily="2" charset="0"/>
-              </a:rPr>
-              <a:t>  2 + 3</a:t>
-            </a:r>
-          </a:p>
-          <a:p>
-            <a:r>
-              <a:rPr lang="en-US" dirty="0">
-                <a:latin typeface="Courier" pitchFamily="2" charset="0"/>
-              </a:rPr>
-              <a:t>end</a:t>
-            </a:r>
-          </a:p>
-        </p:txBody>
-      </p:sp>
-      <p:cxnSp>
-        <p:nvCxnSpPr>
-          <p:cNvPr id="10" name="Curved Connector 9">
-            <a:extLst>
-              <a:ext uri="{FF2B5EF4-FFF2-40B4-BE49-F238E27FC236}">
-                <a16:creationId xmlns:a16="http://schemas.microsoft.com/office/drawing/2014/main" id="{0467C29A-09F8-7249-B09B-968E3E5F85AF}"/>
-              </a:ext>
-            </a:extLst>
-          </p:cNvPr>
-          <p:cNvCxnSpPr>
-            <a:cxnSpLocks/>
-          </p:cNvCxnSpPr>
-          <p:nvPr/>
-        </p:nvCxnSpPr>
-        <p:spPr>
-          <a:xfrm rot="10800000">
-            <a:off x="8773888" y="3897088"/>
-            <a:ext cx="1426026" cy="674913"/>
-          </a:xfrm>
-          <a:prstGeom prst="curvedConnector3">
-            <a:avLst>
-              <a:gd name="adj1" fmla="val 50000"/>
-            </a:avLst>
-          </a:prstGeom>
-          <a:ln>
-            <a:tailEnd type="triangle"/>
-          </a:ln>
-        </p:spPr>
-        <p:style>
-          <a:lnRef idx="1">
-            <a:schemeClr val="accent1"/>
-          </a:lnRef>
-          <a:fillRef idx="0">
-            <a:schemeClr val="accent1"/>
-          </a:fillRef>
-          <a:effectRef idx="0">
-            <a:schemeClr val="accent1"/>
-          </a:effectRef>
-          <a:fontRef idx="minor">
-            <a:schemeClr val="tx1"/>
-          </a:fontRef>
-        </p:style>
-      </p:cxnSp>
-      <p:sp>
-        <p:nvSpPr>
-          <p:cNvPr id="13" name="TextBox 12">
-            <a:extLst>
-              <a:ext uri="{FF2B5EF4-FFF2-40B4-BE49-F238E27FC236}">
-                <a16:creationId xmlns:a16="http://schemas.microsoft.com/office/drawing/2014/main" id="{88804008-6195-444C-B7B0-32A5EB795614}"/>
-              </a:ext>
-            </a:extLst>
-          </p:cNvPr>
-          <p:cNvSpPr txBox="1"/>
-          <p:nvPr/>
-        </p:nvSpPr>
-        <p:spPr>
-          <a:xfrm>
-            <a:off x="10308772" y="4023067"/>
-            <a:ext cx="1338943" cy="2031325"/>
-          </a:xfrm>
-          <a:prstGeom prst="rect">
-            <a:avLst/>
-          </a:prstGeom>
-          <a:noFill/>
-        </p:spPr>
-        <p:txBody>
-          <a:bodyPr wrap="square" rtlCol="0">
-            <a:spAutoFit/>
-          </a:bodyPr>
-          <a:lstStyle/>
-          <a:p>
-            <a:r>
-              <a:rPr lang="en-US" dirty="0"/>
-              <a:t>BTW, in Pascal,</a:t>
-            </a:r>
-          </a:p>
-          <a:p>
-            <a:r>
-              <a:rPr lang="en-US" dirty="0"/>
-              <a:t>; wasn’t mandatory</a:t>
-            </a:r>
-          </a:p>
-          <a:p>
-            <a:r>
-              <a:rPr lang="en-US" dirty="0"/>
-              <a:t>in the last statement</a:t>
-            </a:r>
-          </a:p>
-          <a:p>
-            <a:r>
-              <a:rPr lang="en-US" dirty="0"/>
-              <a:t>of a block</a:t>
-            </a:r>
-          </a:p>
-        </p:txBody>
-      </p:sp>
     </p:spTree>
     <p:extLst>
       <p:ext uri="{BB962C8B-B14F-4D97-AF65-F5344CB8AC3E}">
-        <p14:creationId xmlns:p14="http://schemas.microsoft.com/office/powerpoint/2010/main" val="4075599883"/>
+        <p14:creationId xmlns:p14="http://schemas.microsoft.com/office/powerpoint/2010/main" val="3435547643"/>
       </p:ext>
     </p:extLst>
   </p:cSld>
@@ -16340,7 +16163,7 @@
           <p:cNvPr id="2" name="Title 1">
             <a:extLst>
               <a:ext uri="{FF2B5EF4-FFF2-40B4-BE49-F238E27FC236}">
-                <a16:creationId xmlns:a16="http://schemas.microsoft.com/office/drawing/2014/main" id="{436AF0A7-51C5-1444-B093-96372F2B2D7C}"/>
+                <a16:creationId xmlns:a16="http://schemas.microsoft.com/office/drawing/2014/main" id="{CAD010CF-B650-1D4F-9663-6E9DE2D0CE8B}"/>
               </a:ext>
             </a:extLst>
           </p:cNvPr>
@@ -16358,7 +16181,7 @@
           <a:p>
             <a:r>
               <a:rPr lang="en-US" dirty="0"/>
-              <a:t>Orthogonality</a:t>
+              <a:t>Assignment Operators</a:t>
             </a:r>
           </a:p>
         </p:txBody>
@@ -16368,7 +16191,7 @@
           <p:cNvPr id="3" name="Content Placeholder 2">
             <a:extLst>
               <a:ext uri="{FF2B5EF4-FFF2-40B4-BE49-F238E27FC236}">
-                <a16:creationId xmlns:a16="http://schemas.microsoft.com/office/drawing/2014/main" id="{1E8796C6-7D66-B84C-A832-80B165D00697}"/>
+                <a16:creationId xmlns:a16="http://schemas.microsoft.com/office/drawing/2014/main" id="{58E44E04-8B91-F14F-9E76-4CB7115475FA}"/>
               </a:ext>
             </a:extLst>
           </p:cNvPr>
@@ -16379,44 +16202,36 @@
             <p:ph idx="1"/>
           </p:nvPr>
         </p:nvSpPr>
-        <p:spPr/>
-        <p:txBody>
-          <a:bodyPr/>
+        <p:spPr>
+          <a:xfrm>
+            <a:off x="849086" y="1825625"/>
+            <a:ext cx="10515600" cy="4351338"/>
+          </a:xfrm>
+        </p:spPr>
+        <p:txBody>
+          <a:bodyPr>
+            <a:noAutofit/>
+          </a:bodyPr>
           <a:lstStyle/>
           <a:p>
             <a:r>
-              <a:rPr lang="en-US" dirty="0"/>
-              <a:t>C takes a middle-of-the-road approach</a:t>
-            </a:r>
-          </a:p>
-          <a:p>
-            <a:r>
-              <a:rPr lang="en-US" dirty="0"/>
-              <a:t>C has “expression statements”</a:t>
-            </a:r>
-          </a:p>
-          <a:p>
-            <a:r>
-              <a:rPr lang="en-US" dirty="0"/>
-              <a:t>Idea: expressions can appear where statements are expected, but the reverse does not hold (e.g. a program with “3;” will compile)</a:t>
-            </a:r>
-          </a:p>
-          <a:p>
-            <a:r>
-              <a:rPr lang="en-US" dirty="0"/>
-              <a:t>C computes values for expression statements, then discards them</a:t>
-            </a:r>
-          </a:p>
-          <a:p>
-            <a:r>
-              <a:rPr lang="en-US" dirty="0"/>
-              <a:t>C and Algol68 allow assignments in expressions</a:t>
-            </a:r>
-          </a:p>
-          <a:p>
-            <a:r>
-              <a:rPr lang="en-US" dirty="0"/>
-              <a:t>(Return ) value of assignment is the rightmost value</a:t>
+              <a:rPr lang="en-US" sz="2200" dirty="0"/>
+              <a:t>Postfix form: NOT syntactic sugar, i.e. has different semantics. Consider:</a:t>
+            </a:r>
+          </a:p>
+          <a:p>
+            <a:pPr marL="457200" lvl="1" indent="0">
+              <a:buNone/>
+            </a:pPr>
+            <a:r>
+              <a:rPr lang="en-US" sz="1800" dirty="0"/>
+              <a:t>*p++ = *q++;</a:t>
+            </a:r>
+          </a:p>
+          <a:p>
+            <a:r>
+              <a:rPr lang="en-US" sz="2600" dirty="0"/>
+              <a:t>The above copies values from q to p, then advances both pointers</a:t>
             </a:r>
           </a:p>
         </p:txBody>
@@ -16426,7 +16241,7 @@
           <p:cNvPr id="4" name="Footer Placeholder 3">
             <a:extLst>
               <a:ext uri="{FF2B5EF4-FFF2-40B4-BE49-F238E27FC236}">
-                <a16:creationId xmlns:a16="http://schemas.microsoft.com/office/drawing/2014/main" id="{A6B9C445-7B96-DC49-AE1F-F38EC4399A5E}"/>
+                <a16:creationId xmlns:a16="http://schemas.microsoft.com/office/drawing/2014/main" id="{4F2F4CC8-DD49-5546-BB91-6D864ED389B1}"/>
               </a:ext>
             </a:extLst>
           </p:cNvPr>
@@ -16454,7 +16269,7 @@
           <p:cNvPr id="5" name="Slide Number Placeholder 4">
             <a:extLst>
               <a:ext uri="{FF2B5EF4-FFF2-40B4-BE49-F238E27FC236}">
-                <a16:creationId xmlns:a16="http://schemas.microsoft.com/office/drawing/2014/main" id="{55091B2A-C279-334D-9FC7-A3A1BAB0748F}"/>
+                <a16:creationId xmlns:a16="http://schemas.microsoft.com/office/drawing/2014/main" id="{5644DC75-A76A-B349-BFFD-CC0F7EAA6036}"/>
               </a:ext>
             </a:extLst>
           </p:cNvPr>
@@ -16478,49 +16293,10 @@
           </a:p>
         </p:txBody>
       </p:sp>
-      <p:sp>
-        <p:nvSpPr>
-          <p:cNvPr id="6" name="TextBox 5">
-            <a:extLst>
-              <a:ext uri="{FF2B5EF4-FFF2-40B4-BE49-F238E27FC236}">
-                <a16:creationId xmlns:a16="http://schemas.microsoft.com/office/drawing/2014/main" id="{E9206B5E-FC20-0541-BFD9-92309336E6A8}"/>
-              </a:ext>
-            </a:extLst>
-          </p:cNvPr>
-          <p:cNvSpPr txBox="1"/>
-          <p:nvPr/>
-        </p:nvSpPr>
-        <p:spPr>
-          <a:xfrm>
-            <a:off x="1175657" y="5584371"/>
-            <a:ext cx="6261266" cy="369332"/>
-          </a:xfrm>
-          <a:prstGeom prst="rect">
-            <a:avLst/>
-          </a:prstGeom>
-          <a:noFill/>
-        </p:spPr>
-        <p:txBody>
-          <a:bodyPr wrap="none" rtlCol="0">
-            <a:spAutoFit/>
-          </a:bodyPr>
-          <a:lstStyle/>
-          <a:p>
-            <a:r>
-              <a:rPr lang="en-US" dirty="0">
-                <a:solidFill>
-                  <a:srgbClr val="FF0000"/>
-                </a:solidFill>
-              </a:rPr>
-              <a:t>Check example 6.19 of book (assignment and equality operators)</a:t>
-            </a:r>
-          </a:p>
-        </p:txBody>
-      </p:sp>
     </p:spTree>
     <p:extLst>
       <p:ext uri="{BB962C8B-B14F-4D97-AF65-F5344CB8AC3E}">
-        <p14:creationId xmlns:p14="http://schemas.microsoft.com/office/powerpoint/2010/main" val="3325098685"/>
+        <p14:creationId xmlns:p14="http://schemas.microsoft.com/office/powerpoint/2010/main" val="3842255684"/>
       </p:ext>
     </p:extLst>
   </p:cSld>
@@ -16713,7 +16489,7 @@
           <p:cNvPr id="2" name="Title 1">
             <a:extLst>
               <a:ext uri="{FF2B5EF4-FFF2-40B4-BE49-F238E27FC236}">
-                <a16:creationId xmlns:a16="http://schemas.microsoft.com/office/drawing/2014/main" id="{CAD010CF-B650-1D4F-9663-6E9DE2D0CE8B}"/>
+                <a16:creationId xmlns:a16="http://schemas.microsoft.com/office/drawing/2014/main" id="{B4A0EB4E-1AA4-2B4C-8ABD-782442005571}"/>
               </a:ext>
             </a:extLst>
           </p:cNvPr>
@@ -16731,7 +16507,7 @@
           <a:p>
             <a:r>
               <a:rPr lang="en-US" dirty="0"/>
-              <a:t>Assignment Operators</a:t>
+              <a:t>Initialization</a:t>
             </a:r>
           </a:p>
         </p:txBody>
@@ -16741,7 +16517,7 @@
           <p:cNvPr id="3" name="Content Placeholder 2">
             <a:extLst>
               <a:ext uri="{FF2B5EF4-FFF2-40B4-BE49-F238E27FC236}">
-                <a16:creationId xmlns:a16="http://schemas.microsoft.com/office/drawing/2014/main" id="{58E44E04-8B91-F14F-9E76-4CB7115475FA}"/>
+                <a16:creationId xmlns:a16="http://schemas.microsoft.com/office/drawing/2014/main" id="{89AF9150-0147-1040-AEBF-269A379D5ED1}"/>
               </a:ext>
             </a:extLst>
           </p:cNvPr>
@@ -16755,98 +16531,88 @@
         <p:spPr/>
         <p:txBody>
           <a:bodyPr>
-            <a:noAutofit/>
+            <a:normAutofit/>
           </a:bodyPr>
           <a:lstStyle/>
           <a:p>
             <a:r>
               <a:rPr lang="en-US" sz="2200" dirty="0"/>
-              <a:t>Assignment operators modify memory:</a:t>
+              <a:t>Not all (imperative) languages provide mechanisms for declaration + initialization (a la c </a:t>
+            </a:r>
+            <a:r>
+              <a:rPr lang="en-US" sz="2200" dirty="0">
+                <a:sym typeface="Wingdings" pitchFamily="2" charset="2"/>
+              </a:rPr>
+              <a:t> int c = (2 * something);)</a:t>
+            </a:r>
+          </a:p>
+          <a:p>
+            <a:r>
+              <a:rPr lang="en-US" sz="2200" dirty="0">
+                <a:sym typeface="Wingdings" pitchFamily="2" charset="2"/>
+              </a:rPr>
+              <a:t>Useful to initialize variables:</a:t>
             </a:r>
           </a:p>
           <a:p>
             <a:pPr lvl="1"/>
             <a:r>
-              <a:rPr lang="en-US" sz="2200" dirty="0"/>
-              <a:t>+=</a:t>
+              <a:rPr lang="en-US" sz="2200" dirty="0">
+                <a:sym typeface="Wingdings" pitchFamily="2" charset="2"/>
+              </a:rPr>
+              <a:t>static variables local to subroutines need an initial value (usually 0)</a:t>
             </a:r>
           </a:p>
           <a:p>
             <a:pPr lvl="1"/>
             <a:r>
-              <a:rPr lang="en-US" sz="2200" dirty="0"/>
-              <a:t>*=</a:t>
+              <a:rPr lang="en-US" sz="2200" dirty="0">
+                <a:sym typeface="Wingdings" pitchFamily="2" charset="2"/>
+              </a:rPr>
+              <a:t>Initialized static variables can use global memory</a:t>
             </a:r>
           </a:p>
           <a:p>
             <a:pPr lvl="1"/>
             <a:r>
-              <a:rPr lang="en-US" sz="2200" dirty="0"/>
-              <a:t>op=</a:t>
-            </a:r>
-          </a:p>
-          <a:p>
-            <a:r>
-              <a:rPr lang="en-US" sz="2200" dirty="0"/>
-              <a:t>Advantage: </a:t>
-            </a:r>
+              <a:rPr lang="en-US" sz="2200" dirty="0">
+                <a:sym typeface="Wingdings" pitchFamily="2" charset="2"/>
+              </a:rPr>
+              <a:t>Avoid computational errors</a:t>
+            </a:r>
+          </a:p>
+          <a:p>
+            <a:r>
+              <a:rPr lang="en-US" sz="2200" dirty="0">
+                <a:sym typeface="Wingdings" pitchFamily="2" charset="2"/>
+              </a:rPr>
+              <a:t>Most languages will have mechanisms to initialize variables for pre-built datatypes</a:t>
+            </a:r>
+          </a:p>
+          <a:p>
+            <a:r>
+              <a:rPr lang="en-US" sz="2200" dirty="0">
+                <a:sym typeface="Wingdings" pitchFamily="2" charset="2"/>
+              </a:rPr>
+              <a:t>Special mechanisms for “aggregate” types, i.e. arrays, structures</a:t>
+            </a:r>
+          </a:p>
+          <a:p>
+            <a:r>
+              <a:rPr lang="en-US" sz="2200" dirty="0">
+                <a:sym typeface="Wingdings" pitchFamily="2" charset="2"/>
+              </a:rPr>
+              <a:t>Initialization saves time only for statically allocated variables, not for stack variables nor for heap variables</a:t>
+            </a:r>
+          </a:p>
+          <a:p>
+            <a:endParaRPr lang="en-US" sz="2200" dirty="0">
+              <a:sym typeface="Wingdings" pitchFamily="2" charset="2"/>
+            </a:endParaRPr>
           </a:p>
           <a:p>
             <a:pPr lvl="1"/>
-            <a:r>
-              <a:rPr lang="en-US" sz="2200" dirty="0"/>
-              <a:t>address calculation performed just once </a:t>
-            </a:r>
-          </a:p>
-          <a:p>
-            <a:pPr lvl="1"/>
-            <a:r>
-              <a:rPr lang="en-US" sz="2200" dirty="0"/>
-              <a:t>simplifies code (we write a lot of  something = something + </a:t>
-            </a:r>
-            <a:r>
-              <a:rPr lang="en-US" sz="2200" dirty="0" err="1"/>
-              <a:t>somethingelse</a:t>
-            </a:r>
-            <a:r>
-              <a:rPr lang="en-US" sz="2200" dirty="0"/>
-              <a:t>)</a:t>
-            </a:r>
-          </a:p>
-          <a:p>
-            <a:r>
-              <a:rPr lang="en-US" sz="2200" dirty="0"/>
-              <a:t>C provides an assignment operator for each of its binary arithmetic and bit-wise operators, for a total of 10</a:t>
-            </a:r>
-          </a:p>
-          <a:p>
-            <a:pPr lvl="1"/>
-            <a:r>
-              <a:rPr lang="en-US" sz="2200" dirty="0"/>
-              <a:t>also prefix and postfix [</a:t>
-            </a:r>
-            <a:r>
-              <a:rPr lang="en-US" sz="2200" dirty="0" err="1"/>
-              <a:t>in|de</a:t>
-            </a:r>
-            <a:r>
-              <a:rPr lang="en-US" sz="2200" dirty="0"/>
-              <a:t>]</a:t>
-            </a:r>
-            <a:r>
-              <a:rPr lang="en-US" sz="2200" dirty="0" err="1"/>
-              <a:t>crements</a:t>
-            </a:r>
-            <a:r>
-              <a:rPr lang="en-US" sz="2200" dirty="0"/>
-              <a:t>: var++, ++var, var-- and –var</a:t>
-            </a:r>
-          </a:p>
-          <a:p>
-            <a:r>
-              <a:rPr lang="en-US" sz="2200" dirty="0"/>
-              <a:t>Prefix form: syntactic sugar for += and -=</a:t>
-            </a:r>
+            <a:endParaRPr lang="en-US" sz="2200" dirty="0"/>
           </a:p>
         </p:txBody>
       </p:sp>
@@ -16855,7 +16621,7 @@
           <p:cNvPr id="4" name="Footer Placeholder 3">
             <a:extLst>
               <a:ext uri="{FF2B5EF4-FFF2-40B4-BE49-F238E27FC236}">
-                <a16:creationId xmlns:a16="http://schemas.microsoft.com/office/drawing/2014/main" id="{4F2F4CC8-DD49-5546-BB91-6D864ED389B1}"/>
+                <a16:creationId xmlns:a16="http://schemas.microsoft.com/office/drawing/2014/main" id="{7EA9CF60-7B4D-FD4F-B8EA-2015AAA8675D}"/>
               </a:ext>
             </a:extLst>
           </p:cNvPr>
@@ -16883,7 +16649,7 @@
           <p:cNvPr id="5" name="Slide Number Placeholder 4">
             <a:extLst>
               <a:ext uri="{FF2B5EF4-FFF2-40B4-BE49-F238E27FC236}">
-                <a16:creationId xmlns:a16="http://schemas.microsoft.com/office/drawing/2014/main" id="{5644DC75-A76A-B349-BFFD-CC0F7EAA6036}"/>
+                <a16:creationId xmlns:a16="http://schemas.microsoft.com/office/drawing/2014/main" id="{CDF8E211-BD44-0849-A8CF-8A6C33472BFD}"/>
               </a:ext>
             </a:extLst>
           </p:cNvPr>
@@ -16910,7 +16676,7 @@
     </p:spTree>
     <p:extLst>
       <p:ext uri="{BB962C8B-B14F-4D97-AF65-F5344CB8AC3E}">
-        <p14:creationId xmlns:p14="http://schemas.microsoft.com/office/powerpoint/2010/main" val="3435547643"/>
+        <p14:creationId xmlns:p14="http://schemas.microsoft.com/office/powerpoint/2010/main" val="3521490672"/>
       </p:ext>
     </p:extLst>
   </p:cSld>
@@ -16942,7 +16708,7 @@
           <p:cNvPr id="2" name="Title 1">
             <a:extLst>
               <a:ext uri="{FF2B5EF4-FFF2-40B4-BE49-F238E27FC236}">
-                <a16:creationId xmlns:a16="http://schemas.microsoft.com/office/drawing/2014/main" id="{CAD010CF-B650-1D4F-9663-6E9DE2D0CE8B}"/>
+                <a16:creationId xmlns:a16="http://schemas.microsoft.com/office/drawing/2014/main" id="{57D13241-B387-C542-BFE5-2C41FC7CF4E8}"/>
               </a:ext>
             </a:extLst>
           </p:cNvPr>
@@ -16960,7 +16726,7 @@
           <a:p>
             <a:r>
               <a:rPr lang="en-US" dirty="0"/>
-              <a:t>Assignment Operators</a:t>
+              <a:t>Definite Assignment</a:t>
             </a:r>
           </a:p>
         </p:txBody>
@@ -16970,7 +16736,7 @@
           <p:cNvPr id="3" name="Content Placeholder 2">
             <a:extLst>
               <a:ext uri="{FF2B5EF4-FFF2-40B4-BE49-F238E27FC236}">
-                <a16:creationId xmlns:a16="http://schemas.microsoft.com/office/drawing/2014/main" id="{58E44E04-8B91-F14F-9E76-4CB7115475FA}"/>
+                <a16:creationId xmlns:a16="http://schemas.microsoft.com/office/drawing/2014/main" id="{41DFB636-A2D8-E145-9BC3-CF2674F2ECBC}"/>
               </a:ext>
             </a:extLst>
           </p:cNvPr>
@@ -16983,34 +16749,41 @@
         </p:nvSpPr>
         <p:spPr>
           <a:xfrm>
-            <a:off x="849086" y="1825625"/>
-            <a:ext cx="10515600" cy="4351338"/>
+            <a:off x="838200" y="1825625"/>
+            <a:ext cx="5475514" cy="4351338"/>
           </a:xfrm>
         </p:spPr>
         <p:txBody>
-          <a:bodyPr>
-            <a:noAutofit/>
-          </a:bodyPr>
+          <a:bodyPr/>
           <a:lstStyle/>
           <a:p>
             <a:r>
-              <a:rPr lang="en-US" sz="2200" dirty="0"/>
-              <a:t>Postfix form: NOT syntactic sugar, i.e. has different semantics. Consider:</a:t>
-            </a:r>
-          </a:p>
-          <a:p>
-            <a:pPr marL="457200" lvl="1" indent="0">
-              <a:buNone/>
-            </a:pPr>
-            <a:r>
-              <a:rPr lang="en-US" sz="1800" dirty="0"/>
-              <a:t>*p++ = *q++;</a:t>
-            </a:r>
-          </a:p>
-          <a:p>
-            <a:r>
-              <a:rPr lang="en-US" sz="2600" dirty="0"/>
-              <a:t>The above copies values from q to p, then advances both pointers</a:t>
+              <a:rPr lang="en-US" dirty="0"/>
+              <a:t>Uses the (static) control flow of the program</a:t>
+            </a:r>
+          </a:p>
+          <a:p>
+            <a:r>
+              <a:rPr lang="en-US" dirty="0"/>
+              <a:t>Conservative analysis</a:t>
+            </a:r>
+          </a:p>
+          <a:p>
+            <a:r>
+              <a:rPr lang="en-US" dirty="0"/>
+              <a:t>Considers every possible execution path in the program</a:t>
+            </a:r>
+          </a:p>
+          <a:p>
+            <a:r>
+              <a:rPr lang="en-US" dirty="0"/>
+              <a:t>Languages like java use this</a:t>
+            </a:r>
+          </a:p>
+          <a:p>
+            <a:r>
+              <a:rPr lang="en-US" dirty="0"/>
+              <a:t>Example:</a:t>
             </a:r>
           </a:p>
         </p:txBody>
@@ -17020,7 +16793,7 @@
           <p:cNvPr id="4" name="Footer Placeholder 3">
             <a:extLst>
               <a:ext uri="{FF2B5EF4-FFF2-40B4-BE49-F238E27FC236}">
-                <a16:creationId xmlns:a16="http://schemas.microsoft.com/office/drawing/2014/main" id="{4F2F4CC8-DD49-5546-BB91-6D864ED389B1}"/>
+                <a16:creationId xmlns:a16="http://schemas.microsoft.com/office/drawing/2014/main" id="{D59A4132-76D9-B647-8B34-4B86AE612525}"/>
               </a:ext>
             </a:extLst>
           </p:cNvPr>
@@ -17048,7 +16821,7 @@
           <p:cNvPr id="5" name="Slide Number Placeholder 4">
             <a:extLst>
               <a:ext uri="{FF2B5EF4-FFF2-40B4-BE49-F238E27FC236}">
-                <a16:creationId xmlns:a16="http://schemas.microsoft.com/office/drawing/2014/main" id="{5644DC75-A76A-B349-BFFD-CC0F7EAA6036}"/>
+                <a16:creationId xmlns:a16="http://schemas.microsoft.com/office/drawing/2014/main" id="{88FD1DCA-45EA-2D4C-812A-CBE874F4F98B}"/>
               </a:ext>
             </a:extLst>
           </p:cNvPr>
@@ -17067,397 +16840,6 @@
             <a:fld id="{ABC98F02-4831-DB41-B2A1-83D581DBC9B9}" type="slidenum">
               <a:rPr lang="en-US" smtClean="0"/>
               <a:t>31</a:t>
-            </a:fld>
-            <a:endParaRPr lang="en-US"/>
-          </a:p>
-        </p:txBody>
-      </p:sp>
-    </p:spTree>
-    <p:extLst>
-      <p:ext uri="{BB962C8B-B14F-4D97-AF65-F5344CB8AC3E}">
-        <p14:creationId xmlns:p14="http://schemas.microsoft.com/office/powerpoint/2010/main" val="3842255684"/>
-      </p:ext>
-    </p:extLst>
-  </p:cSld>
-  <p:clrMapOvr>
-    <a:masterClrMapping/>
-  </p:clrMapOvr>
-</p:sld>
-</file>
-
-<file path=ppt/slides/slide32.xml><?xml version="1.0" encoding="utf-8"?>
-<p:sld xmlns:a="http://schemas.openxmlformats.org/drawingml/2006/main" xmlns:r="http://schemas.openxmlformats.org/officeDocument/2006/relationships" xmlns:p="http://schemas.openxmlformats.org/presentationml/2006/main">
-  <p:cSld>
-    <p:spTree>
-      <p:nvGrpSpPr>
-        <p:cNvPr id="1" name=""/>
-        <p:cNvGrpSpPr/>
-        <p:nvPr/>
-      </p:nvGrpSpPr>
-      <p:grpSpPr>
-        <a:xfrm>
-          <a:off x="0" y="0"/>
-          <a:ext cx="0" cy="0"/>
-          <a:chOff x="0" y="0"/>
-          <a:chExt cx="0" cy="0"/>
-        </a:xfrm>
-      </p:grpSpPr>
-      <p:sp>
-        <p:nvSpPr>
-          <p:cNvPr id="2" name="Title 1">
-            <a:extLst>
-              <a:ext uri="{FF2B5EF4-FFF2-40B4-BE49-F238E27FC236}">
-                <a16:creationId xmlns:a16="http://schemas.microsoft.com/office/drawing/2014/main" id="{B4A0EB4E-1AA4-2B4C-8ABD-782442005571}"/>
-              </a:ext>
-            </a:extLst>
-          </p:cNvPr>
-          <p:cNvSpPr>
-            <a:spLocks noGrp="1"/>
-          </p:cNvSpPr>
-          <p:nvPr>
-            <p:ph type="title"/>
-          </p:nvPr>
-        </p:nvSpPr>
-        <p:spPr/>
-        <p:txBody>
-          <a:bodyPr/>
-          <a:lstStyle/>
-          <a:p>
-            <a:r>
-              <a:rPr lang="en-US" dirty="0"/>
-              <a:t>Initialization</a:t>
-            </a:r>
-          </a:p>
-        </p:txBody>
-      </p:sp>
-      <p:sp>
-        <p:nvSpPr>
-          <p:cNvPr id="3" name="Content Placeholder 2">
-            <a:extLst>
-              <a:ext uri="{FF2B5EF4-FFF2-40B4-BE49-F238E27FC236}">
-                <a16:creationId xmlns:a16="http://schemas.microsoft.com/office/drawing/2014/main" id="{89AF9150-0147-1040-AEBF-269A379D5ED1}"/>
-              </a:ext>
-            </a:extLst>
-          </p:cNvPr>
-          <p:cNvSpPr>
-            <a:spLocks noGrp="1"/>
-          </p:cNvSpPr>
-          <p:nvPr>
-            <p:ph idx="1"/>
-          </p:nvPr>
-        </p:nvSpPr>
-        <p:spPr/>
-        <p:txBody>
-          <a:bodyPr>
-            <a:normAutofit/>
-          </a:bodyPr>
-          <a:lstStyle/>
-          <a:p>
-            <a:r>
-              <a:rPr lang="en-US" sz="2200" dirty="0"/>
-              <a:t>Not all (imperative) languages provide mechanisms for declaration + initialization (a la c </a:t>
-            </a:r>
-            <a:r>
-              <a:rPr lang="en-US" sz="2200" dirty="0">
-                <a:sym typeface="Wingdings" pitchFamily="2" charset="2"/>
-              </a:rPr>
-              <a:t> int c = (2 * something);)</a:t>
-            </a:r>
-          </a:p>
-          <a:p>
-            <a:r>
-              <a:rPr lang="en-US" sz="2200" dirty="0">
-                <a:sym typeface="Wingdings" pitchFamily="2" charset="2"/>
-              </a:rPr>
-              <a:t>Useful to initialize variables:</a:t>
-            </a:r>
-          </a:p>
-          <a:p>
-            <a:pPr lvl="1"/>
-            <a:r>
-              <a:rPr lang="en-US" sz="2200" dirty="0">
-                <a:sym typeface="Wingdings" pitchFamily="2" charset="2"/>
-              </a:rPr>
-              <a:t>static variables local to subroutines need an initial value (usually 0)</a:t>
-            </a:r>
-          </a:p>
-          <a:p>
-            <a:pPr lvl="1"/>
-            <a:r>
-              <a:rPr lang="en-US" sz="2200" dirty="0">
-                <a:sym typeface="Wingdings" pitchFamily="2" charset="2"/>
-              </a:rPr>
-              <a:t>Initialized static variables can use global memory</a:t>
-            </a:r>
-          </a:p>
-          <a:p>
-            <a:pPr lvl="1"/>
-            <a:r>
-              <a:rPr lang="en-US" sz="2200" dirty="0">
-                <a:sym typeface="Wingdings" pitchFamily="2" charset="2"/>
-              </a:rPr>
-              <a:t>Avoid computational errors</a:t>
-            </a:r>
-          </a:p>
-          <a:p>
-            <a:r>
-              <a:rPr lang="en-US" sz="2200" dirty="0">
-                <a:sym typeface="Wingdings" pitchFamily="2" charset="2"/>
-              </a:rPr>
-              <a:t>Most languages will have mechanisms to initialize variables for pre-built datatypes</a:t>
-            </a:r>
-          </a:p>
-          <a:p>
-            <a:r>
-              <a:rPr lang="en-US" sz="2200" dirty="0">
-                <a:sym typeface="Wingdings" pitchFamily="2" charset="2"/>
-              </a:rPr>
-              <a:t>Special mechanisms for “aggregate” types, i.e. arrays, structures</a:t>
-            </a:r>
-          </a:p>
-          <a:p>
-            <a:r>
-              <a:rPr lang="en-US" sz="2200" dirty="0">
-                <a:sym typeface="Wingdings" pitchFamily="2" charset="2"/>
-              </a:rPr>
-              <a:t>Initialization saves time only for statically allocated variables, not for stack variables nor for heap variables</a:t>
-            </a:r>
-          </a:p>
-          <a:p>
-            <a:endParaRPr lang="en-US" sz="2200" dirty="0">
-              <a:sym typeface="Wingdings" pitchFamily="2" charset="2"/>
-            </a:endParaRPr>
-          </a:p>
-          <a:p>
-            <a:pPr lvl="1"/>
-            <a:endParaRPr lang="en-US" sz="2200" dirty="0"/>
-          </a:p>
-        </p:txBody>
-      </p:sp>
-      <p:sp>
-        <p:nvSpPr>
-          <p:cNvPr id="4" name="Footer Placeholder 3">
-            <a:extLst>
-              <a:ext uri="{FF2B5EF4-FFF2-40B4-BE49-F238E27FC236}">
-                <a16:creationId xmlns:a16="http://schemas.microsoft.com/office/drawing/2014/main" id="{7EA9CF60-7B4D-FD4F-B8EA-2015AAA8675D}"/>
-              </a:ext>
-            </a:extLst>
-          </p:cNvPr>
-          <p:cNvSpPr>
-            <a:spLocks noGrp="1"/>
-          </p:cNvSpPr>
-          <p:nvPr>
-            <p:ph type="ftr" sz="quarter" idx="11"/>
-          </p:nvPr>
-        </p:nvSpPr>
-        <p:spPr/>
-        <p:txBody>
-          <a:bodyPr/>
-          <a:lstStyle/>
-          <a:p>
-            <a:r>
-              <a:rPr lang="en-US"/>
-              <a:t>Principles of Programming Languages</a:t>
-            </a:r>
-          </a:p>
-        </p:txBody>
-      </p:sp>
-      <p:sp>
-        <p:nvSpPr>
-          <p:cNvPr id="5" name="Slide Number Placeholder 4">
-            <a:extLst>
-              <a:ext uri="{FF2B5EF4-FFF2-40B4-BE49-F238E27FC236}">
-                <a16:creationId xmlns:a16="http://schemas.microsoft.com/office/drawing/2014/main" id="{CDF8E211-BD44-0849-A8CF-8A6C33472BFD}"/>
-              </a:ext>
-            </a:extLst>
-          </p:cNvPr>
-          <p:cNvSpPr>
-            <a:spLocks noGrp="1"/>
-          </p:cNvSpPr>
-          <p:nvPr>
-            <p:ph type="sldNum" sz="quarter" idx="12"/>
-          </p:nvPr>
-        </p:nvSpPr>
-        <p:spPr/>
-        <p:txBody>
-          <a:bodyPr/>
-          <a:lstStyle/>
-          <a:p>
-            <a:fld id="{ABC98F02-4831-DB41-B2A1-83D581DBC9B9}" type="slidenum">
-              <a:rPr lang="en-US" smtClean="0"/>
-              <a:t>32</a:t>
-            </a:fld>
-            <a:endParaRPr lang="en-US"/>
-          </a:p>
-        </p:txBody>
-      </p:sp>
-    </p:spTree>
-    <p:extLst>
-      <p:ext uri="{BB962C8B-B14F-4D97-AF65-F5344CB8AC3E}">
-        <p14:creationId xmlns:p14="http://schemas.microsoft.com/office/powerpoint/2010/main" val="3521490672"/>
-      </p:ext>
-    </p:extLst>
-  </p:cSld>
-  <p:clrMapOvr>
-    <a:masterClrMapping/>
-  </p:clrMapOvr>
-</p:sld>
-</file>
-
-<file path=ppt/slides/slide33.xml><?xml version="1.0" encoding="utf-8"?>
-<p:sld xmlns:a="http://schemas.openxmlformats.org/drawingml/2006/main" xmlns:r="http://schemas.openxmlformats.org/officeDocument/2006/relationships" xmlns:p="http://schemas.openxmlformats.org/presentationml/2006/main">
-  <p:cSld>
-    <p:spTree>
-      <p:nvGrpSpPr>
-        <p:cNvPr id="1" name=""/>
-        <p:cNvGrpSpPr/>
-        <p:nvPr/>
-      </p:nvGrpSpPr>
-      <p:grpSpPr>
-        <a:xfrm>
-          <a:off x="0" y="0"/>
-          <a:ext cx="0" cy="0"/>
-          <a:chOff x="0" y="0"/>
-          <a:chExt cx="0" cy="0"/>
-        </a:xfrm>
-      </p:grpSpPr>
-      <p:sp>
-        <p:nvSpPr>
-          <p:cNvPr id="2" name="Title 1">
-            <a:extLst>
-              <a:ext uri="{FF2B5EF4-FFF2-40B4-BE49-F238E27FC236}">
-                <a16:creationId xmlns:a16="http://schemas.microsoft.com/office/drawing/2014/main" id="{57D13241-B387-C542-BFE5-2C41FC7CF4E8}"/>
-              </a:ext>
-            </a:extLst>
-          </p:cNvPr>
-          <p:cNvSpPr>
-            <a:spLocks noGrp="1"/>
-          </p:cNvSpPr>
-          <p:nvPr>
-            <p:ph type="title"/>
-          </p:nvPr>
-        </p:nvSpPr>
-        <p:spPr/>
-        <p:txBody>
-          <a:bodyPr/>
-          <a:lstStyle/>
-          <a:p>
-            <a:r>
-              <a:rPr lang="en-US" dirty="0"/>
-              <a:t>Definite Assignment</a:t>
-            </a:r>
-          </a:p>
-        </p:txBody>
-      </p:sp>
-      <p:sp>
-        <p:nvSpPr>
-          <p:cNvPr id="3" name="Content Placeholder 2">
-            <a:extLst>
-              <a:ext uri="{FF2B5EF4-FFF2-40B4-BE49-F238E27FC236}">
-                <a16:creationId xmlns:a16="http://schemas.microsoft.com/office/drawing/2014/main" id="{41DFB636-A2D8-E145-9BC3-CF2674F2ECBC}"/>
-              </a:ext>
-            </a:extLst>
-          </p:cNvPr>
-          <p:cNvSpPr>
-            <a:spLocks noGrp="1"/>
-          </p:cNvSpPr>
-          <p:nvPr>
-            <p:ph idx="1"/>
-          </p:nvPr>
-        </p:nvSpPr>
-        <p:spPr>
-          <a:xfrm>
-            <a:off x="838200" y="1825625"/>
-            <a:ext cx="5475514" cy="4351338"/>
-          </a:xfrm>
-        </p:spPr>
-        <p:txBody>
-          <a:bodyPr/>
-          <a:lstStyle/>
-          <a:p>
-            <a:r>
-              <a:rPr lang="en-US" dirty="0"/>
-              <a:t>Uses the (static) control flow of the program</a:t>
-            </a:r>
-          </a:p>
-          <a:p>
-            <a:r>
-              <a:rPr lang="en-US" dirty="0"/>
-              <a:t>Conservative analysis</a:t>
-            </a:r>
-          </a:p>
-          <a:p>
-            <a:r>
-              <a:rPr lang="en-US" dirty="0"/>
-              <a:t>Considers every possible execution path in the program</a:t>
-            </a:r>
-          </a:p>
-          <a:p>
-            <a:r>
-              <a:rPr lang="en-US" dirty="0"/>
-              <a:t>Languages like java use this</a:t>
-            </a:r>
-          </a:p>
-          <a:p>
-            <a:r>
-              <a:rPr lang="en-US" dirty="0"/>
-              <a:t>Example:</a:t>
-            </a:r>
-          </a:p>
-        </p:txBody>
-      </p:sp>
-      <p:sp>
-        <p:nvSpPr>
-          <p:cNvPr id="4" name="Footer Placeholder 3">
-            <a:extLst>
-              <a:ext uri="{FF2B5EF4-FFF2-40B4-BE49-F238E27FC236}">
-                <a16:creationId xmlns:a16="http://schemas.microsoft.com/office/drawing/2014/main" id="{D59A4132-76D9-B647-8B34-4B86AE612525}"/>
-              </a:ext>
-            </a:extLst>
-          </p:cNvPr>
-          <p:cNvSpPr>
-            <a:spLocks noGrp="1"/>
-          </p:cNvSpPr>
-          <p:nvPr>
-            <p:ph type="ftr" sz="quarter" idx="11"/>
-          </p:nvPr>
-        </p:nvSpPr>
-        <p:spPr/>
-        <p:txBody>
-          <a:bodyPr/>
-          <a:lstStyle/>
-          <a:p>
-            <a:r>
-              <a:rPr lang="en-US"/>
-              <a:t>Principles of Programming Languages</a:t>
-            </a:r>
-          </a:p>
-        </p:txBody>
-      </p:sp>
-      <p:sp>
-        <p:nvSpPr>
-          <p:cNvPr id="5" name="Slide Number Placeholder 4">
-            <a:extLst>
-              <a:ext uri="{FF2B5EF4-FFF2-40B4-BE49-F238E27FC236}">
-                <a16:creationId xmlns:a16="http://schemas.microsoft.com/office/drawing/2014/main" id="{88FD1DCA-45EA-2D4C-812A-CBE874F4F98B}"/>
-              </a:ext>
-            </a:extLst>
-          </p:cNvPr>
-          <p:cNvSpPr>
-            <a:spLocks noGrp="1"/>
-          </p:cNvSpPr>
-          <p:nvPr>
-            <p:ph type="sldNum" sz="quarter" idx="12"/>
-          </p:nvPr>
-        </p:nvSpPr>
-        <p:spPr/>
-        <p:txBody>
-          <a:bodyPr/>
-          <a:lstStyle/>
-          <a:p>
-            <a:fld id="{ABC98F02-4831-DB41-B2A1-83D581DBC9B9}" type="slidenum">
-              <a:rPr lang="en-US" smtClean="0"/>
-              <a:t>33</a:t>
             </a:fld>
             <a:endParaRPr lang="en-US"/>
           </a:p>
@@ -18237,7 +17619,7 @@
 </p:sld>
 </file>
 
-<file path=ppt/slides/slide34.xml><?xml version="1.0" encoding="utf-8"?>
+<file path=ppt/slides/slide32.xml><?xml version="1.0" encoding="utf-8"?>
 <p:sld xmlns:a="http://schemas.openxmlformats.org/drawingml/2006/main" xmlns:r="http://schemas.openxmlformats.org/officeDocument/2006/relationships" xmlns:p="http://schemas.openxmlformats.org/presentationml/2006/main">
   <p:cSld>
     <p:spTree>
@@ -18439,7 +17821,7 @@
           <a:p>
             <a:fld id="{ABC98F02-4831-DB41-B2A1-83D581DBC9B9}" type="slidenum">
               <a:rPr lang="en-US" smtClean="0"/>
-              <a:t>34</a:t>
+              <a:t>32</a:t>
             </a:fld>
             <a:endParaRPr lang="en-US"/>
           </a:p>

</xml_diff>